<commit_message>
Correção do pitch versão final
</commit_message>
<xml_diff>
--- a/PastaDocumentos/PITCH.pptx
+++ b/PastaDocumentos/PITCH.pptx
@@ -3391,10 +3391,10 @@
       </p:sp>
       <p:sp>
         <p:nvSpPr>
-          <p:cNvPr id="4" name="Oval 3">
-            <a:extLst>
-              <a:ext uri="{FF2B5EF4-FFF2-40B4-BE49-F238E27FC236}">
-                <a16:creationId xmlns:a16="http://schemas.microsoft.com/office/drawing/2014/main" id="{633CF10A-1263-437E-B830-9E80D98B1B32}"/>
+          <p:cNvPr id="5" name="Rectangle 4">
+            <a:extLst>
+              <a:ext uri="{FF2B5EF4-FFF2-40B4-BE49-F238E27FC236}">
+                <a16:creationId xmlns:a16="http://schemas.microsoft.com/office/drawing/2014/main" id="{2C9AF9AD-041D-4CEF-BA69-883FABC4958F}"/>
               </a:ext>
             </a:extLst>
           </p:cNvPr>
@@ -3403,24 +3403,24 @@
         </p:nvSpPr>
         <p:spPr>
           <a:xfrm>
-            <a:off x="9719733" y="4176889"/>
-            <a:ext cx="1840089" cy="1727200"/>
+            <a:off x="846667" y="4481689"/>
+            <a:ext cx="1501422" cy="1004711"/>
           </a:xfrm>
-          <a:prstGeom prst="ellipse">
+          <a:prstGeom prst="rect">
             <a:avLst/>
           </a:prstGeom>
         </p:spPr>
         <p:style>
           <a:lnRef idx="2">
-            <a:schemeClr val="accent1">
+            <a:schemeClr val="accent2">
               <a:shade val="50000"/>
             </a:schemeClr>
           </a:lnRef>
           <a:fillRef idx="1">
-            <a:schemeClr val="accent1"/>
+            <a:schemeClr val="accent2"/>
           </a:fillRef>
           <a:effectRef idx="0">
-            <a:schemeClr val="accent1"/>
+            <a:schemeClr val="accent2"/>
           </a:effectRef>
           <a:fontRef idx="minor">
             <a:schemeClr val="lt1"/>

</xml_diff>